<commit_message>
Adding decile analysis to modeling notebook, report, and deck
</commit_message>
<xml_diff>
--- a/springboard_capstone_3/reports/Capstone_Three_Final_Slides_NGM .pptx
+++ b/springboard_capstone_3/reports/Capstone_Three_Final_Slides_NGM .pptx
@@ -814,7 +814,7 @@
   <p:cSld>
     <p:spTree>
       <p:nvGrpSpPr>
-        <p:cNvPr id="118" name="Shape 118"/>
+        <p:cNvPr id="115" name="Shape 115"/>
         <p:cNvGrpSpPr/>
         <p:nvPr/>
       </p:nvGrpSpPr>
@@ -828,7 +828,7 @@
       </p:grpSpPr>
       <p:sp>
         <p:nvSpPr>
-          <p:cNvPr id="119" name="Google Shape;119;g2ad7475b273_0_118:notes"/>
+          <p:cNvPr id="116" name="Google Shape;116;g2ad7475b273_0_118:notes"/>
           <p:cNvSpPr/>
           <p:nvPr>
             <p:ph idx="2" type="sldImg"/>
@@ -863,7 +863,7 @@
       </p:sp>
       <p:sp>
         <p:nvSpPr>
-          <p:cNvPr id="120" name="Google Shape;120;g2ad7475b273_0_118:notes"/>
+          <p:cNvPr id="117" name="Google Shape;117;g2ad7475b273_0_118:notes"/>
           <p:cNvSpPr txBox="1"/>
           <p:nvPr>
             <p:ph idx="1" type="body"/>
@@ -913,7 +913,7 @@
   <p:cSld>
     <p:spTree>
       <p:nvGrpSpPr>
-        <p:cNvPr id="126" name="Shape 126"/>
+        <p:cNvPr id="123" name="Shape 123"/>
         <p:cNvGrpSpPr/>
         <p:nvPr/>
       </p:nvGrpSpPr>
@@ -927,7 +927,7 @@
       </p:grpSpPr>
       <p:sp>
         <p:nvSpPr>
-          <p:cNvPr id="127" name="Google Shape;127;g2bd118fc171_0_35:notes"/>
+          <p:cNvPr id="124" name="Google Shape;124;g2bd118fc171_0_35:notes"/>
           <p:cNvSpPr/>
           <p:nvPr>
             <p:ph idx="2" type="sldImg"/>
@@ -962,7 +962,7 @@
       </p:sp>
       <p:sp>
         <p:nvSpPr>
-          <p:cNvPr id="128" name="Google Shape;128;g2bd118fc171_0_35:notes"/>
+          <p:cNvPr id="125" name="Google Shape;125;g2bd118fc171_0_35:notes"/>
           <p:cNvSpPr txBox="1"/>
           <p:nvPr>
             <p:ph idx="1" type="body"/>
@@ -1012,7 +1012,7 @@
   <p:cSld>
     <p:spTree>
       <p:nvGrpSpPr>
-        <p:cNvPr id="134" name="Shape 134"/>
+        <p:cNvPr id="131" name="Shape 131"/>
         <p:cNvGrpSpPr/>
         <p:nvPr/>
       </p:nvGrpSpPr>
@@ -1026,7 +1026,7 @@
       </p:grpSpPr>
       <p:sp>
         <p:nvSpPr>
-          <p:cNvPr id="135" name="Google Shape;135;g2ad7475b273_0_129:notes"/>
+          <p:cNvPr id="132" name="Google Shape;132;g2ad7475b273_0_129:notes"/>
           <p:cNvSpPr/>
           <p:nvPr>
             <p:ph idx="2" type="sldImg"/>
@@ -1061,7 +1061,7 @@
       </p:sp>
       <p:sp>
         <p:nvSpPr>
-          <p:cNvPr id="136" name="Google Shape;136;g2ad7475b273_0_129:notes"/>
+          <p:cNvPr id="133" name="Google Shape;133;g2ad7475b273_0_129:notes"/>
           <p:cNvSpPr txBox="1"/>
           <p:nvPr>
             <p:ph idx="1" type="body"/>
@@ -1111,7 +1111,7 @@
   <p:cSld>
     <p:spTree>
       <p:nvGrpSpPr>
-        <p:cNvPr id="142" name="Shape 142"/>
+        <p:cNvPr id="139" name="Shape 139"/>
         <p:cNvGrpSpPr/>
         <p:nvPr/>
       </p:nvGrpSpPr>
@@ -1125,7 +1125,7 @@
       </p:grpSpPr>
       <p:sp>
         <p:nvSpPr>
-          <p:cNvPr id="143" name="Google Shape;143;g2ad7475b273_0_140:notes"/>
+          <p:cNvPr id="140" name="Google Shape;140;g2ad7475b273_0_140:notes"/>
           <p:cNvSpPr/>
           <p:nvPr>
             <p:ph idx="2" type="sldImg"/>
@@ -1160,7 +1160,7 @@
       </p:sp>
       <p:sp>
         <p:nvSpPr>
-          <p:cNvPr id="144" name="Google Shape;144;g2ad7475b273_0_140:notes"/>
+          <p:cNvPr id="141" name="Google Shape;141;g2ad7475b273_0_140:notes"/>
           <p:cNvSpPr txBox="1"/>
           <p:nvPr>
             <p:ph idx="1" type="body"/>
@@ -1210,7 +1210,7 @@
   <p:cSld>
     <p:spTree>
       <p:nvGrpSpPr>
-        <p:cNvPr id="150" name="Shape 150"/>
+        <p:cNvPr id="147" name="Shape 147"/>
         <p:cNvGrpSpPr/>
         <p:nvPr/>
       </p:nvGrpSpPr>
@@ -1224,7 +1224,7 @@
       </p:grpSpPr>
       <p:sp>
         <p:nvSpPr>
-          <p:cNvPr id="151" name="Google Shape;151;g2ad7475b273_0_154:notes"/>
+          <p:cNvPr id="148" name="Google Shape;148;g2ad7475b273_0_154:notes"/>
           <p:cNvSpPr/>
           <p:nvPr>
             <p:ph idx="2" type="sldImg"/>
@@ -1259,7 +1259,7 @@
       </p:sp>
       <p:sp>
         <p:nvSpPr>
-          <p:cNvPr id="152" name="Google Shape;152;g2ad7475b273_0_154:notes"/>
+          <p:cNvPr id="149" name="Google Shape;149;g2ad7475b273_0_154:notes"/>
           <p:cNvSpPr txBox="1"/>
           <p:nvPr>
             <p:ph idx="1" type="body"/>
@@ -1309,7 +1309,7 @@
   <p:cSld>
     <p:spTree>
       <p:nvGrpSpPr>
-        <p:cNvPr id="159" name="Shape 159"/>
+        <p:cNvPr id="156" name="Shape 156"/>
         <p:cNvGrpSpPr/>
         <p:nvPr/>
       </p:nvGrpSpPr>
@@ -1323,7 +1323,7 @@
       </p:grpSpPr>
       <p:sp>
         <p:nvSpPr>
-          <p:cNvPr id="160" name="Google Shape;160;g2ad7475b273_0_188:notes"/>
+          <p:cNvPr id="157" name="Google Shape;157;g2ad7475b273_0_188:notes"/>
           <p:cNvSpPr/>
           <p:nvPr>
             <p:ph idx="2" type="sldImg"/>
@@ -1358,7 +1358,7 @@
       </p:sp>
       <p:sp>
         <p:nvSpPr>
-          <p:cNvPr id="161" name="Google Shape;161;g2ad7475b273_0_188:notes"/>
+          <p:cNvPr id="158" name="Google Shape;158;g2ad7475b273_0_188:notes"/>
           <p:cNvSpPr txBox="1"/>
           <p:nvPr>
             <p:ph idx="1" type="body"/>
@@ -1408,7 +1408,7 @@
   <p:cSld>
     <p:spTree>
       <p:nvGrpSpPr>
-        <p:cNvPr id="167" name="Shape 167"/>
+        <p:cNvPr id="164" name="Shape 164"/>
         <p:cNvGrpSpPr/>
         <p:nvPr/>
       </p:nvGrpSpPr>
@@ -1422,7 +1422,7 @@
       </p:grpSpPr>
       <p:sp>
         <p:nvSpPr>
-          <p:cNvPr id="168" name="Google Shape;168;g2ad7475b273_0_206:notes"/>
+          <p:cNvPr id="165" name="Google Shape;165;g2ad7475b273_0_206:notes"/>
           <p:cNvSpPr/>
           <p:nvPr>
             <p:ph idx="2" type="sldImg"/>
@@ -1457,7 +1457,7 @@
       </p:sp>
       <p:sp>
         <p:nvSpPr>
-          <p:cNvPr id="169" name="Google Shape;169;g2ad7475b273_0_206:notes"/>
+          <p:cNvPr id="166" name="Google Shape;166;g2ad7475b273_0_206:notes"/>
           <p:cNvSpPr txBox="1"/>
           <p:nvPr>
             <p:ph idx="1" type="body"/>
@@ -2082,7 +2082,8 @@
               <a:buNone/>
             </a:pPr>
             <a:r>
-              <a:t/>
+              <a:rPr lang="en"/>
+              <a:t>Resize images</a:t>
             </a:r>
             <a:endParaRPr/>
           </a:p>
@@ -2101,7 +2102,7 @@
   <p:cSld>
     <p:spTree>
       <p:nvGrpSpPr>
-        <p:cNvPr id="103" name="Shape 103"/>
+        <p:cNvPr id="100" name="Shape 100"/>
         <p:cNvGrpSpPr/>
         <p:nvPr/>
       </p:nvGrpSpPr>
@@ -2115,7 +2116,7 @@
       </p:grpSpPr>
       <p:sp>
         <p:nvSpPr>
-          <p:cNvPr id="104" name="Google Shape;104;g2ad7475b273_0_108:notes"/>
+          <p:cNvPr id="101" name="Google Shape;101;g2ad7475b273_0_108:notes"/>
           <p:cNvSpPr/>
           <p:nvPr>
             <p:ph idx="2" type="sldImg"/>
@@ -2150,7 +2151,7 @@
       </p:sp>
       <p:sp>
         <p:nvSpPr>
-          <p:cNvPr id="105" name="Google Shape;105;g2ad7475b273_0_108:notes"/>
+          <p:cNvPr id="102" name="Google Shape;102;g2ad7475b273_0_108:notes"/>
           <p:cNvSpPr txBox="1"/>
           <p:nvPr>
             <p:ph idx="1" type="body"/>
@@ -2200,7 +2201,7 @@
   <p:cSld>
     <p:spTree>
       <p:nvGrpSpPr>
-        <p:cNvPr id="111" name="Shape 111"/>
+        <p:cNvPr id="108" name="Shape 108"/>
         <p:cNvGrpSpPr/>
         <p:nvPr/>
       </p:nvGrpSpPr>
@@ -2214,7 +2215,7 @@
       </p:grpSpPr>
       <p:sp>
         <p:nvSpPr>
-          <p:cNvPr id="112" name="Google Shape;112;g2bd118fc171_0_25:notes"/>
+          <p:cNvPr id="109" name="Google Shape;109;g2bd118fc171_0_25:notes"/>
           <p:cNvSpPr/>
           <p:nvPr>
             <p:ph idx="2" type="sldImg"/>
@@ -2249,7 +2250,7 @@
       </p:sp>
       <p:sp>
         <p:nvSpPr>
-          <p:cNvPr id="113" name="Google Shape;113;g2bd118fc171_0_25:notes"/>
+          <p:cNvPr id="110" name="Google Shape;110;g2bd118fc171_0_25:notes"/>
           <p:cNvSpPr txBox="1"/>
           <p:nvPr>
             <p:ph idx="1" type="body"/>
@@ -7112,7 +7113,7 @@
                 <a:cs typeface="Montserrat"/>
                 <a:sym typeface="Montserrat"/>
               </a:rPr>
-              <a:t>Using Transfer Learning and CNNs</a:t>
+              <a:t>Using Transfer Learning with CNNs</a:t>
             </a:r>
             <a:endParaRPr>
               <a:latin typeface="Montserrat"/>
@@ -7136,7 +7137,7 @@
   <p:cSld>
     <p:spTree>
       <p:nvGrpSpPr>
-        <p:cNvPr id="121" name="Shape 121"/>
+        <p:cNvPr id="118" name="Shape 118"/>
         <p:cNvGrpSpPr/>
         <p:nvPr/>
       </p:nvGrpSpPr>
@@ -7150,7 +7151,7 @@
       </p:grpSpPr>
       <p:sp>
         <p:nvSpPr>
-          <p:cNvPr id="122" name="Google Shape;122;p22"/>
+          <p:cNvPr id="119" name="Google Shape;119;p22"/>
           <p:cNvSpPr txBox="1"/>
           <p:nvPr>
             <p:ph type="title"/>
@@ -7200,7 +7201,7 @@
       </p:sp>
       <p:sp>
         <p:nvSpPr>
-          <p:cNvPr id="123" name="Google Shape;123;p22"/>
+          <p:cNvPr id="120" name="Google Shape;120;p22"/>
           <p:cNvSpPr txBox="1"/>
           <p:nvPr>
             <p:ph idx="1" type="body"/>
@@ -7485,7 +7486,7 @@
       </p:sp>
       <p:sp>
         <p:nvSpPr>
-          <p:cNvPr id="124" name="Google Shape;124;p22"/>
+          <p:cNvPr id="121" name="Google Shape;121;p22"/>
           <p:cNvSpPr txBox="1"/>
           <p:nvPr/>
         </p:nvSpPr>
@@ -7530,7 +7531,7 @@
       </p:sp>
       <p:pic>
         <p:nvPicPr>
-          <p:cNvPr id="125" name="Google Shape;125;p22"/>
+          <p:cNvPr id="122" name="Google Shape;122;p22"/>
           <p:cNvPicPr preferRelativeResize="0"/>
           <p:nvPr/>
         </p:nvPicPr>
@@ -7569,7 +7570,7 @@
   <p:cSld>
     <p:spTree>
       <p:nvGrpSpPr>
-        <p:cNvPr id="129" name="Shape 129"/>
+        <p:cNvPr id="126" name="Shape 126"/>
         <p:cNvGrpSpPr/>
         <p:nvPr/>
       </p:nvGrpSpPr>
@@ -7583,7 +7584,7 @@
       </p:grpSpPr>
       <p:sp>
         <p:nvSpPr>
-          <p:cNvPr id="130" name="Google Shape;130;p23"/>
+          <p:cNvPr id="127" name="Google Shape;127;p23"/>
           <p:cNvSpPr txBox="1"/>
           <p:nvPr>
             <p:ph type="title"/>
@@ -7633,7 +7634,7 @@
       </p:sp>
       <p:sp>
         <p:nvSpPr>
-          <p:cNvPr id="131" name="Google Shape;131;p23"/>
+          <p:cNvPr id="128" name="Google Shape;128;p23"/>
           <p:cNvSpPr txBox="1"/>
           <p:nvPr>
             <p:ph idx="1" type="body"/>
@@ -7797,7 +7798,7 @@
       </p:sp>
       <p:sp>
         <p:nvSpPr>
-          <p:cNvPr id="132" name="Google Shape;132;p23"/>
+          <p:cNvPr id="129" name="Google Shape;129;p23"/>
           <p:cNvSpPr txBox="1"/>
           <p:nvPr/>
         </p:nvSpPr>
@@ -7842,7 +7843,7 @@
       </p:sp>
       <p:pic>
         <p:nvPicPr>
-          <p:cNvPr id="133" name="Google Shape;133;p23"/>
+          <p:cNvPr id="130" name="Google Shape;130;p23"/>
           <p:cNvPicPr preferRelativeResize="0"/>
           <p:nvPr/>
         </p:nvPicPr>
@@ -7881,7 +7882,7 @@
   <p:cSld>
     <p:spTree>
       <p:nvGrpSpPr>
-        <p:cNvPr id="137" name="Shape 137"/>
+        <p:cNvPr id="134" name="Shape 134"/>
         <p:cNvGrpSpPr/>
         <p:nvPr/>
       </p:nvGrpSpPr>
@@ -7895,7 +7896,7 @@
       </p:grpSpPr>
       <p:sp>
         <p:nvSpPr>
-          <p:cNvPr id="138" name="Google Shape;138;p24"/>
+          <p:cNvPr id="135" name="Google Shape;135;p24"/>
           <p:cNvSpPr txBox="1"/>
           <p:nvPr>
             <p:ph type="title"/>
@@ -7945,7 +7946,7 @@
       </p:sp>
       <p:sp>
         <p:nvSpPr>
-          <p:cNvPr id="139" name="Google Shape;139;p24"/>
+          <p:cNvPr id="136" name="Google Shape;136;p24"/>
           <p:cNvSpPr txBox="1"/>
           <p:nvPr>
             <p:ph idx="1" type="body"/>
@@ -8193,7 +8194,7 @@
       </p:sp>
       <p:sp>
         <p:nvSpPr>
-          <p:cNvPr id="140" name="Google Shape;140;p24"/>
+          <p:cNvPr id="137" name="Google Shape;137;p24"/>
           <p:cNvSpPr txBox="1"/>
           <p:nvPr/>
         </p:nvSpPr>
@@ -8238,7 +8239,7 @@
       </p:sp>
       <p:pic>
         <p:nvPicPr>
-          <p:cNvPr id="141" name="Google Shape;141;p24"/>
+          <p:cNvPr id="138" name="Google Shape;138;p24"/>
           <p:cNvPicPr preferRelativeResize="0"/>
           <p:nvPr/>
         </p:nvPicPr>
@@ -8277,7 +8278,7 @@
   <p:cSld>
     <p:spTree>
       <p:nvGrpSpPr>
-        <p:cNvPr id="145" name="Shape 145"/>
+        <p:cNvPr id="142" name="Shape 142"/>
         <p:cNvGrpSpPr/>
         <p:nvPr/>
       </p:nvGrpSpPr>
@@ -8291,7 +8292,7 @@
       </p:grpSpPr>
       <p:sp>
         <p:nvSpPr>
-          <p:cNvPr id="146" name="Google Shape;146;p25"/>
+          <p:cNvPr id="143" name="Google Shape;143;p25"/>
           <p:cNvSpPr txBox="1"/>
           <p:nvPr>
             <p:ph type="title"/>
@@ -8341,7 +8342,7 @@
       </p:sp>
       <p:sp>
         <p:nvSpPr>
-          <p:cNvPr id="147" name="Google Shape;147;p25"/>
+          <p:cNvPr id="144" name="Google Shape;144;p25"/>
           <p:cNvSpPr txBox="1"/>
           <p:nvPr>
             <p:ph idx="1" type="body"/>
@@ -8449,7 +8450,7 @@
       </p:sp>
       <p:sp>
         <p:nvSpPr>
-          <p:cNvPr id="148" name="Google Shape;148;p25"/>
+          <p:cNvPr id="145" name="Google Shape;145;p25"/>
           <p:cNvSpPr txBox="1"/>
           <p:nvPr/>
         </p:nvSpPr>
@@ -8494,7 +8495,7 @@
       </p:sp>
       <p:pic>
         <p:nvPicPr>
-          <p:cNvPr id="149" name="Google Shape;149;p25"/>
+          <p:cNvPr id="146" name="Google Shape;146;p25"/>
           <p:cNvPicPr preferRelativeResize="0"/>
           <p:nvPr/>
         </p:nvPicPr>
@@ -8533,7 +8534,7 @@
   <p:cSld>
     <p:spTree>
       <p:nvGrpSpPr>
-        <p:cNvPr id="153" name="Shape 153"/>
+        <p:cNvPr id="150" name="Shape 150"/>
         <p:cNvGrpSpPr/>
         <p:nvPr/>
       </p:nvGrpSpPr>
@@ -8547,7 +8548,7 @@
       </p:grpSpPr>
       <p:sp>
         <p:nvSpPr>
-          <p:cNvPr id="154" name="Google Shape;154;p26"/>
+          <p:cNvPr id="151" name="Google Shape;151;p26"/>
           <p:cNvSpPr txBox="1"/>
           <p:nvPr>
             <p:ph type="title"/>
@@ -8584,7 +8585,7 @@
                 <a:cs typeface="Montserrat"/>
                 <a:sym typeface="Montserrat"/>
               </a:rPr>
-              <a:t>Testing Set - Further Analysis (continued)</a:t>
+              <a:t>Testing Set - Decile Analysis</a:t>
             </a:r>
             <a:endParaRPr>
               <a:latin typeface="Montserrat"/>
@@ -8597,7 +8598,7 @@
       </p:sp>
       <p:sp>
         <p:nvSpPr>
-          <p:cNvPr id="155" name="Google Shape;155;p26"/>
+          <p:cNvPr id="152" name="Google Shape;152;p26"/>
           <p:cNvSpPr txBox="1"/>
           <p:nvPr>
             <p:ph idx="1" type="body"/>
@@ -8645,7 +8646,7 @@
                 <a:cs typeface="Montserrat"/>
                 <a:sym typeface="Montserrat"/>
               </a:rPr>
-              <a:t>odel tended to perform better when it was more confident in a prediction</a:t>
+              <a:t>ore true malignant cases as predicted probabilities increased</a:t>
             </a:r>
             <a:endParaRPr>
               <a:latin typeface="Montserrat"/>
@@ -8673,7 +8674,7 @@
                 <a:cs typeface="Montserrat"/>
                 <a:sym typeface="Montserrat"/>
               </a:rPr>
-              <a:t>Effect was noticeable for both malignant and benign predictions</a:t>
+              <a:t>Effect was most noticeable at the extremes</a:t>
             </a:r>
             <a:endParaRPr>
               <a:latin typeface="Montserrat"/>
@@ -8714,7 +8715,7 @@
       </p:sp>
       <p:sp>
         <p:nvSpPr>
-          <p:cNvPr id="156" name="Google Shape;156;p26"/>
+          <p:cNvPr id="153" name="Google Shape;153;p26"/>
           <p:cNvSpPr txBox="1"/>
           <p:nvPr/>
         </p:nvSpPr>
@@ -8759,7 +8760,7 @@
       </p:sp>
       <p:pic>
         <p:nvPicPr>
-          <p:cNvPr id="157" name="Google Shape;157;p26"/>
+          <p:cNvPr id="154" name="Google Shape;154;p26"/>
           <p:cNvPicPr preferRelativeResize="0"/>
           <p:nvPr/>
         </p:nvPicPr>
@@ -8773,8 +8774,8 @@
         </p:blipFill>
         <p:spPr>
           <a:xfrm>
-            <a:off x="5464825" y="1111150"/>
-            <a:ext cx="2954800" cy="1690400"/>
+            <a:off x="5680625" y="1017724"/>
+            <a:ext cx="2526061" cy="1554025"/>
           </a:xfrm>
           <a:prstGeom prst="rect">
             <a:avLst/>
@@ -8787,7 +8788,7 @@
       </p:pic>
       <p:pic>
         <p:nvPicPr>
-          <p:cNvPr id="158" name="Google Shape;158;p26"/>
+          <p:cNvPr id="155" name="Google Shape;155;p26"/>
           <p:cNvPicPr preferRelativeResize="0"/>
           <p:nvPr/>
         </p:nvPicPr>
@@ -8801,8 +8802,8 @@
         </p:blipFill>
         <p:spPr>
           <a:xfrm>
-            <a:off x="5463065" y="2894975"/>
-            <a:ext cx="2956561" cy="1690400"/>
+            <a:off x="5680625" y="2885700"/>
+            <a:ext cx="2526050" cy="1559007"/>
           </a:xfrm>
           <a:prstGeom prst="rect">
             <a:avLst/>
@@ -8826,7 +8827,7 @@
   <p:cSld>
     <p:spTree>
       <p:nvGrpSpPr>
-        <p:cNvPr id="162" name="Shape 162"/>
+        <p:cNvPr id="159" name="Shape 159"/>
         <p:cNvGrpSpPr/>
         <p:nvPr/>
       </p:nvGrpSpPr>
@@ -8840,7 +8841,7 @@
       </p:grpSpPr>
       <p:sp>
         <p:nvSpPr>
-          <p:cNvPr id="163" name="Google Shape;163;p27"/>
+          <p:cNvPr id="160" name="Google Shape;160;p27"/>
           <p:cNvSpPr txBox="1"/>
           <p:nvPr>
             <p:ph type="title"/>
@@ -8890,7 +8891,7 @@
       </p:sp>
       <p:sp>
         <p:nvSpPr>
-          <p:cNvPr id="164" name="Google Shape;164;p27"/>
+          <p:cNvPr id="161" name="Google Shape;161;p27"/>
           <p:cNvSpPr txBox="1"/>
           <p:nvPr>
             <p:ph idx="1" type="body"/>
@@ -8929,7 +8930,7 @@
                 <a:cs typeface="Montserrat"/>
                 <a:sym typeface="Montserrat"/>
               </a:rPr>
-              <a:t>Model was not able to meet the initial goal of classifying malignant mammograms with &gt; 87.5% specificity</a:t>
+              <a:t>Model was not able to meet the initial goal of classifying malignant mammograms with &gt; 87.5% sensitivity</a:t>
             </a:r>
             <a:endParaRPr>
               <a:latin typeface="Montserrat"/>
@@ -9082,7 +9083,7 @@
       </p:sp>
       <p:sp>
         <p:nvSpPr>
-          <p:cNvPr id="165" name="Google Shape;165;p27"/>
+          <p:cNvPr id="162" name="Google Shape;162;p27"/>
           <p:cNvSpPr txBox="1"/>
           <p:nvPr/>
         </p:nvSpPr>
@@ -9127,7 +9128,7 @@
       </p:sp>
       <p:pic>
         <p:nvPicPr>
-          <p:cNvPr id="166" name="Google Shape;166;p27"/>
+          <p:cNvPr id="163" name="Google Shape;163;p27"/>
           <p:cNvPicPr preferRelativeResize="0"/>
           <p:nvPr/>
         </p:nvPicPr>
@@ -9166,7 +9167,7 @@
   <p:cSld>
     <p:spTree>
       <p:nvGrpSpPr>
-        <p:cNvPr id="170" name="Shape 170"/>
+        <p:cNvPr id="167" name="Shape 167"/>
         <p:cNvGrpSpPr/>
         <p:nvPr/>
       </p:nvGrpSpPr>
@@ -9180,7 +9181,7 @@
       </p:grpSpPr>
       <p:sp>
         <p:nvSpPr>
-          <p:cNvPr id="171" name="Google Shape;171;p28"/>
+          <p:cNvPr id="168" name="Google Shape;168;p28"/>
           <p:cNvSpPr txBox="1"/>
           <p:nvPr>
             <p:ph type="title"/>
@@ -10234,18 +10235,18 @@
         </p:spPr>
         <p:txBody>
           <a:bodyPr anchorCtr="0" anchor="t" bIns="91425" lIns="91425" spcFirstLastPara="1" rIns="91425" wrap="square" tIns="91425">
-            <a:normAutofit lnSpcReduction="20000"/>
+            <a:normAutofit fontScale="92500" lnSpcReduction="10000"/>
           </a:bodyPr>
           <a:lstStyle/>
           <a:p>
-            <a:pPr indent="-342900" lvl="0" marL="457200" rtl="0" algn="l">
-              <a:spcBef>
-                <a:spcPts val="0"/>
-              </a:spcBef>
-              <a:spcAft>
-                <a:spcPts val="0"/>
-              </a:spcAft>
-              <a:buSzPts val="1800"/>
+            <a:pPr indent="-334327" lvl="0" marL="457200" rtl="0" algn="l">
+              <a:spcBef>
+                <a:spcPts val="0"/>
+              </a:spcBef>
+              <a:spcAft>
+                <a:spcPts val="0"/>
+              </a:spcAft>
+              <a:buSzPct val="100000"/>
               <a:buFont typeface="Montserrat"/>
               <a:buChar char="●"/>
             </a:pPr>
@@ -10256,7 +10257,7 @@
                 <a:cs typeface="Montserrat"/>
                 <a:sym typeface="Montserrat"/>
               </a:rPr>
-              <a:t>Use transfer learning and a CNNs to identify malignant abnormalities in mammogram images</a:t>
+              <a:t>Use transfer learning with CNNs to identify malignant abnormalities in mammogram images</a:t>
             </a:r>
             <a:endParaRPr>
               <a:latin typeface="Montserrat"/>
@@ -10266,14 +10267,14 @@
             </a:endParaRPr>
           </a:p>
           <a:p>
-            <a:pPr indent="-342900" lvl="0" marL="457200" rtl="0" algn="l">
-              <a:spcBef>
-                <a:spcPts val="0"/>
-              </a:spcBef>
-              <a:spcAft>
-                <a:spcPts val="0"/>
-              </a:spcAft>
-              <a:buSzPts val="1800"/>
+            <a:pPr indent="-334327" lvl="0" marL="457200" rtl="0" algn="l">
+              <a:spcBef>
+                <a:spcPts val="0"/>
+              </a:spcBef>
+              <a:spcAft>
+                <a:spcPts val="0"/>
+              </a:spcAft>
+              <a:buSzPct val="100000"/>
               <a:buFont typeface="Montserrat"/>
               <a:buChar char="●"/>
             </a:pPr>
@@ -10303,14 +10304,14 @@
             </a:endParaRPr>
           </a:p>
           <a:p>
-            <a:pPr indent="-342900" lvl="0" marL="457200" rtl="0" algn="l">
-              <a:spcBef>
-                <a:spcPts val="0"/>
-              </a:spcBef>
-              <a:spcAft>
-                <a:spcPts val="0"/>
-              </a:spcAft>
-              <a:buSzPts val="1800"/>
+            <a:pPr indent="-334327" lvl="0" marL="457200" rtl="0" algn="l">
+              <a:spcBef>
+                <a:spcPts val="0"/>
+              </a:spcBef>
+              <a:spcAft>
+                <a:spcPts val="0"/>
+              </a:spcAft>
+              <a:buSzPct val="100000"/>
               <a:buFont typeface="Montserrat"/>
               <a:buChar char="●"/>
             </a:pPr>
@@ -10321,7 +10322,7 @@
                 <a:cs typeface="Montserrat"/>
                 <a:sym typeface="Montserrat"/>
               </a:rPr>
-              <a:t>Predict malignant abnormalities with </a:t>
+              <a:t>Predict malignant abnormalities better than a </a:t>
             </a:r>
             <a:r>
               <a:rPr lang="en">
@@ -10330,7 +10331,25 @@
                 <a:cs typeface="Montserrat"/>
                 <a:sym typeface="Montserrat"/>
               </a:rPr>
-              <a:t>&gt; 87.5% sensitivity while having a reasonable specificity</a:t>
+              <a:t>mammographer </a:t>
+            </a:r>
+            <a:r>
+              <a:rPr lang="en">
+                <a:latin typeface="Montserrat"/>
+                <a:ea typeface="Montserrat"/>
+                <a:cs typeface="Montserrat"/>
+                <a:sym typeface="Montserrat"/>
+              </a:rPr>
+              <a:t>(</a:t>
+            </a:r>
+            <a:r>
+              <a:rPr lang="en">
+                <a:latin typeface="Montserrat"/>
+                <a:ea typeface="Montserrat"/>
+                <a:cs typeface="Montserrat"/>
+                <a:sym typeface="Montserrat"/>
+              </a:rPr>
+              <a:t>87.5% sensitivity) while having a reasonable specificity</a:t>
             </a:r>
             <a:endParaRPr>
               <a:latin typeface="Montserrat"/>
@@ -11298,92 +11317,8 @@
         </p:blipFill>
         <p:spPr>
           <a:xfrm>
-            <a:off x="7006613" y="2921750"/>
-            <a:ext cx="1945776" cy="1452850"/>
-          </a:xfrm>
-          <a:prstGeom prst="rect">
-            <a:avLst/>
-          </a:prstGeom>
-          <a:noFill/>
-          <a:ln>
-            <a:noFill/>
-          </a:ln>
-        </p:spPr>
-      </p:pic>
-      <p:pic>
-        <p:nvPicPr>
-          <p:cNvPr id="100" name="Google Shape;100;p19"/>
-          <p:cNvPicPr preferRelativeResize="0"/>
-          <p:nvPr/>
-        </p:nvPicPr>
-        <p:blipFill>
-          <a:blip r:embed="rId4">
-            <a:alphaModFix/>
-          </a:blip>
-          <a:stretch>
-            <a:fillRect/>
-          </a:stretch>
-        </p:blipFill>
-        <p:spPr>
-          <a:xfrm>
-            <a:off x="4990800" y="2921750"/>
-            <a:ext cx="1966525" cy="1452850"/>
-          </a:xfrm>
-          <a:prstGeom prst="rect">
-            <a:avLst/>
-          </a:prstGeom>
-          <a:noFill/>
-          <a:ln>
-            <a:noFill/>
-          </a:ln>
-        </p:spPr>
-      </p:pic>
-      <p:pic>
-        <p:nvPicPr>
-          <p:cNvPr id="101" name="Google Shape;101;p19"/>
-          <p:cNvPicPr preferRelativeResize="0"/>
-          <p:nvPr/>
-        </p:nvPicPr>
-        <p:blipFill>
-          <a:blip r:embed="rId5">
-            <a:alphaModFix/>
-          </a:blip>
-          <a:stretch>
-            <a:fillRect/>
-          </a:stretch>
-        </p:blipFill>
-        <p:spPr>
-          <a:xfrm>
-            <a:off x="7006625" y="1427822"/>
-            <a:ext cx="1945775" cy="1425625"/>
-          </a:xfrm>
-          <a:prstGeom prst="rect">
-            <a:avLst/>
-          </a:prstGeom>
-          <a:noFill/>
-          <a:ln>
-            <a:noFill/>
-          </a:ln>
-        </p:spPr>
-      </p:pic>
-      <p:pic>
-        <p:nvPicPr>
-          <p:cNvPr id="102" name="Google Shape;102;p19"/>
-          <p:cNvPicPr preferRelativeResize="0"/>
-          <p:nvPr/>
-        </p:nvPicPr>
-        <p:blipFill>
-          <a:blip r:embed="rId6">
-            <a:alphaModFix/>
-          </a:blip>
-          <a:stretch>
-            <a:fillRect/>
-          </a:stretch>
-        </p:blipFill>
-        <p:spPr>
-          <a:xfrm>
-            <a:off x="4990788" y="1427825"/>
-            <a:ext cx="1944700" cy="1452850"/>
+            <a:off x="5233085" y="1516963"/>
+            <a:ext cx="3599225" cy="2687425"/>
           </a:xfrm>
           <a:prstGeom prst="rect">
             <a:avLst/>
@@ -11407,7 +11342,7 @@
   <p:cSld>
     <p:spTree>
       <p:nvGrpSpPr>
-        <p:cNvPr id="106" name="Shape 106"/>
+        <p:cNvPr id="103" name="Shape 103"/>
         <p:cNvGrpSpPr/>
         <p:nvPr/>
       </p:nvGrpSpPr>
@@ -11421,7 +11356,7 @@
       </p:grpSpPr>
       <p:sp>
         <p:nvSpPr>
-          <p:cNvPr id="107" name="Google Shape;107;p20"/>
+          <p:cNvPr id="104" name="Google Shape;104;p20"/>
           <p:cNvSpPr txBox="1"/>
           <p:nvPr>
             <p:ph type="title"/>
@@ -11471,7 +11406,7 @@
       </p:sp>
       <p:sp>
         <p:nvSpPr>
-          <p:cNvPr id="108" name="Google Shape;108;p20"/>
+          <p:cNvPr id="105" name="Google Shape;105;p20"/>
           <p:cNvSpPr txBox="1"/>
           <p:nvPr>
             <p:ph idx="1" type="body"/>
@@ -11663,7 +11598,7 @@
       </p:sp>
       <p:pic>
         <p:nvPicPr>
-          <p:cNvPr id="109" name="Google Shape;109;p20"/>
+          <p:cNvPr id="106" name="Google Shape;106;p20"/>
           <p:cNvPicPr preferRelativeResize="0"/>
           <p:nvPr/>
         </p:nvPicPr>
@@ -11691,7 +11626,7 @@
       </p:pic>
       <p:pic>
         <p:nvPicPr>
-          <p:cNvPr id="110" name="Google Shape;110;p20"/>
+          <p:cNvPr id="107" name="Google Shape;107;p20"/>
           <p:cNvPicPr preferRelativeResize="0"/>
           <p:nvPr/>
         </p:nvPicPr>
@@ -11730,7 +11665,7 @@
   <p:cSld>
     <p:spTree>
       <p:nvGrpSpPr>
-        <p:cNvPr id="114" name="Shape 114"/>
+        <p:cNvPr id="111" name="Shape 111"/>
         <p:cNvGrpSpPr/>
         <p:nvPr/>
       </p:nvGrpSpPr>
@@ -11744,7 +11679,7 @@
       </p:grpSpPr>
       <p:sp>
         <p:nvSpPr>
-          <p:cNvPr id="115" name="Google Shape;115;p21"/>
+          <p:cNvPr id="112" name="Google Shape;112;p21"/>
           <p:cNvSpPr txBox="1"/>
           <p:nvPr>
             <p:ph type="title"/>
@@ -11794,7 +11729,7 @@
       </p:sp>
       <p:sp>
         <p:nvSpPr>
-          <p:cNvPr id="116" name="Google Shape;116;p21"/>
+          <p:cNvPr id="113" name="Google Shape;113;p21"/>
           <p:cNvSpPr txBox="1"/>
           <p:nvPr>
             <p:ph idx="1" type="body"/>
@@ -11986,7 +11921,7 @@
       </p:sp>
       <p:pic>
         <p:nvPicPr>
-          <p:cNvPr id="117" name="Google Shape;117;p21"/>
+          <p:cNvPr id="114" name="Google Shape;114;p21"/>
           <p:cNvPicPr preferRelativeResize="0"/>
           <p:nvPr/>
         </p:nvPicPr>
@@ -12021,6 +11956,285 @@
 </file>
 
 <file path=ppt/theme/theme1.xml><?xml version="1.0" encoding="utf-8"?>
+<a:theme xmlns:a="http://schemas.openxmlformats.org/drawingml/2006/main" xmlns:r="http://schemas.openxmlformats.org/officeDocument/2006/relationships" name="Simple Dark">
+  <a:themeElements>
+    <a:clrScheme name="Simple Dark">
+      <a:dk1>
+        <a:srgbClr val="FFFFFF"/>
+      </a:dk1>
+      <a:lt1>
+        <a:srgbClr val="212121"/>
+      </a:lt1>
+      <a:dk2>
+        <a:srgbClr val="303030"/>
+      </a:dk2>
+      <a:lt2>
+        <a:srgbClr val="ADADAD"/>
+      </a:lt2>
+      <a:accent1>
+        <a:srgbClr val="009688"/>
+      </a:accent1>
+      <a:accent2>
+        <a:srgbClr val="EEEEEE"/>
+      </a:accent2>
+      <a:accent3>
+        <a:srgbClr val="78909C"/>
+      </a:accent3>
+      <a:accent4>
+        <a:srgbClr val="FFAB40"/>
+      </a:accent4>
+      <a:accent5>
+        <a:srgbClr val="4DD0E1"/>
+      </a:accent5>
+      <a:accent6>
+        <a:srgbClr val="EEFF41"/>
+      </a:accent6>
+      <a:hlink>
+        <a:srgbClr val="4DD0E1"/>
+      </a:hlink>
+      <a:folHlink>
+        <a:srgbClr val="4DD0E1"/>
+      </a:folHlink>
+    </a:clrScheme>
+    <a:fontScheme name="Office">
+      <a:majorFont>
+        <a:latin typeface="Arial"/>
+        <a:ea typeface=""/>
+        <a:cs typeface=""/>
+        <a:font script="Jpan" typeface="ＭＳ Ｐゴシック"/>
+        <a:font script="Hang" typeface="맑은 고딕"/>
+        <a:font script="Hans" typeface="宋体"/>
+        <a:font script="Hant" typeface="新細明體"/>
+        <a:font script="Arab" typeface="Times New Roman"/>
+        <a:font script="Hebr" typeface="Times New Roman"/>
+        <a:font script="Thai" typeface="Angsana New"/>
+        <a:font script="Ethi" typeface="Nyala"/>
+        <a:font script="Beng" typeface="Vrinda"/>
+        <a:font script="Gujr" typeface="Shruti"/>
+        <a:font script="Khmr" typeface="MoolBoran"/>
+        <a:font script="Knda" typeface="Tunga"/>
+        <a:font script="Guru" typeface="Raavi"/>
+        <a:font script="Cans" typeface="Euphemia"/>
+        <a:font script="Cher" typeface="Plantagenet Cherokee"/>
+        <a:font script="Yiii" typeface="Microsoft Yi Baiti"/>
+        <a:font script="Tibt" typeface="Microsoft Himalaya"/>
+        <a:font script="Thaa" typeface="MV Boli"/>
+        <a:font script="Deva" typeface="Mangal"/>
+        <a:font script="Telu" typeface="Gautami"/>
+        <a:font script="Taml" typeface="Latha"/>
+        <a:font script="Syrc" typeface="Estrangelo Edessa"/>
+        <a:font script="Orya" typeface="Kalinga"/>
+        <a:font script="Mlym" typeface="Kartika"/>
+        <a:font script="Laoo" typeface="DokChampa"/>
+        <a:font script="Sinh" typeface="Iskoola Pota"/>
+        <a:font script="Mong" typeface="Mongolian Baiti"/>
+        <a:font script="Viet" typeface="Times New Roman"/>
+        <a:font script="Uigh" typeface="Microsoft Uighur"/>
+        <a:font script="Geor" typeface="Sylfaen"/>
+      </a:majorFont>
+      <a:minorFont>
+        <a:latin typeface="Arial"/>
+        <a:ea typeface=""/>
+        <a:cs typeface=""/>
+        <a:font script="Jpan" typeface="ＭＳ Ｐゴシック"/>
+        <a:font script="Hang" typeface="맑은 고딕"/>
+        <a:font script="Hans" typeface="宋体"/>
+        <a:font script="Hant" typeface="新細明體"/>
+        <a:font script="Arab" typeface="Arial"/>
+        <a:font script="Hebr" typeface="Arial"/>
+        <a:font script="Thai" typeface="Cordia New"/>
+        <a:font script="Ethi" typeface="Nyala"/>
+        <a:font script="Beng" typeface="Vrinda"/>
+        <a:font script="Gujr" typeface="Shruti"/>
+        <a:font script="Khmr" typeface="DaunPenh"/>
+        <a:font script="Knda" typeface="Tunga"/>
+        <a:font script="Guru" typeface="Raavi"/>
+        <a:font script="Cans" typeface="Euphemia"/>
+        <a:font script="Cher" typeface="Plantagenet Cherokee"/>
+        <a:font script="Yiii" typeface="Microsoft Yi Baiti"/>
+        <a:font script="Tibt" typeface="Microsoft Himalaya"/>
+        <a:font script="Thaa" typeface="MV Boli"/>
+        <a:font script="Deva" typeface="Mangal"/>
+        <a:font script="Telu" typeface="Gautami"/>
+        <a:font script="Taml" typeface="Latha"/>
+        <a:font script="Syrc" typeface="Estrangelo Edessa"/>
+        <a:font script="Orya" typeface="Kalinga"/>
+        <a:font script="Mlym" typeface="Kartika"/>
+        <a:font script="Laoo" typeface="DokChampa"/>
+        <a:font script="Sinh" typeface="Iskoola Pota"/>
+        <a:font script="Mong" typeface="Mongolian Baiti"/>
+        <a:font script="Viet" typeface="Arial"/>
+        <a:font script="Uigh" typeface="Microsoft Uighur"/>
+        <a:font script="Geor" typeface="Sylfaen"/>
+      </a:minorFont>
+    </a:fontScheme>
+    <a:fmtScheme name="Office">
+      <a:fillStyleLst>
+        <a:solidFill>
+          <a:schemeClr val="phClr"/>
+        </a:solidFill>
+        <a:gradFill rotWithShape="1">
+          <a:gsLst>
+            <a:gs pos="0">
+              <a:schemeClr val="phClr">
+                <a:tint val="50000"/>
+                <a:satMod val="300000"/>
+              </a:schemeClr>
+            </a:gs>
+            <a:gs pos="35000">
+              <a:schemeClr val="phClr">
+                <a:tint val="37000"/>
+                <a:satMod val="300000"/>
+              </a:schemeClr>
+            </a:gs>
+            <a:gs pos="100000">
+              <a:schemeClr val="phClr">
+                <a:tint val="15000"/>
+                <a:satMod val="350000"/>
+              </a:schemeClr>
+            </a:gs>
+          </a:gsLst>
+          <a:lin ang="16200000" scaled="1"/>
+        </a:gradFill>
+        <a:gradFill rotWithShape="1">
+          <a:gsLst>
+            <a:gs pos="0">
+              <a:schemeClr val="phClr">
+                <a:tint val="100000"/>
+                <a:shade val="100000"/>
+                <a:satMod val="130000"/>
+              </a:schemeClr>
+            </a:gs>
+            <a:gs pos="100000">
+              <a:schemeClr val="phClr">
+                <a:tint val="50000"/>
+                <a:shade val="100000"/>
+                <a:satMod val="350000"/>
+              </a:schemeClr>
+            </a:gs>
+          </a:gsLst>
+          <a:lin ang="16200000" scaled="0"/>
+        </a:gradFill>
+      </a:fillStyleLst>
+      <a:lnStyleLst>
+        <a:ln w="9525" cap="flat" cmpd="sng" algn="ctr">
+          <a:solidFill>
+            <a:schemeClr val="phClr">
+              <a:shade val="95000"/>
+              <a:satMod val="105000"/>
+            </a:schemeClr>
+          </a:solidFill>
+          <a:prstDash val="solid"/>
+        </a:ln>
+        <a:ln w="25400" cap="flat" cmpd="sng" algn="ctr">
+          <a:solidFill>
+            <a:schemeClr val="phClr"/>
+          </a:solidFill>
+          <a:prstDash val="solid"/>
+        </a:ln>
+        <a:ln w="38100" cap="flat" cmpd="sng" algn="ctr">
+          <a:solidFill>
+            <a:schemeClr val="phClr"/>
+          </a:solidFill>
+          <a:prstDash val="solid"/>
+        </a:ln>
+      </a:lnStyleLst>
+      <a:effectStyleLst>
+        <a:effectStyle>
+          <a:effectLst>
+            <a:outerShdw blurRad="40000" dist="20000" dir="5400000" rotWithShape="0">
+              <a:srgbClr val="000000">
+                <a:alpha val="38000"/>
+              </a:srgbClr>
+            </a:outerShdw>
+          </a:effectLst>
+        </a:effectStyle>
+        <a:effectStyle>
+          <a:effectLst>
+            <a:outerShdw blurRad="40000" dist="23000" dir="5400000" rotWithShape="0">
+              <a:srgbClr val="000000">
+                <a:alpha val="35000"/>
+              </a:srgbClr>
+            </a:outerShdw>
+          </a:effectLst>
+        </a:effectStyle>
+        <a:effectStyle>
+          <a:effectLst>
+            <a:outerShdw blurRad="40000" dist="23000" dir="5400000" rotWithShape="0">
+              <a:srgbClr val="000000">
+                <a:alpha val="35000"/>
+              </a:srgbClr>
+            </a:outerShdw>
+          </a:effectLst>
+          <a:scene3d>
+            <a:camera prst="orthographicFront">
+              <a:rot lat="0" lon="0" rev="0"/>
+            </a:camera>
+            <a:lightRig rig="threePt" dir="t">
+              <a:rot lat="0" lon="0" rev="1200000"/>
+            </a:lightRig>
+          </a:scene3d>
+          <a:sp3d>
+            <a:bevelT w="63500" h="25400"/>
+          </a:sp3d>
+        </a:effectStyle>
+      </a:effectStyleLst>
+      <a:bgFillStyleLst>
+        <a:solidFill>
+          <a:schemeClr val="phClr"/>
+        </a:solidFill>
+        <a:gradFill rotWithShape="1">
+          <a:gsLst>
+            <a:gs pos="0">
+              <a:schemeClr val="phClr">
+                <a:tint val="40000"/>
+                <a:satMod val="350000"/>
+              </a:schemeClr>
+            </a:gs>
+            <a:gs pos="40000">
+              <a:schemeClr val="phClr">
+                <a:tint val="45000"/>
+                <a:shade val="99000"/>
+                <a:satMod val="350000"/>
+              </a:schemeClr>
+            </a:gs>
+            <a:gs pos="100000">
+              <a:schemeClr val="phClr">
+                <a:shade val="20000"/>
+                <a:satMod val="255000"/>
+              </a:schemeClr>
+            </a:gs>
+          </a:gsLst>
+          <a:path path="circle">
+            <a:fillToRect l="50000" t="-80000" r="50000" b="180000"/>
+          </a:path>
+        </a:gradFill>
+        <a:gradFill rotWithShape="1">
+          <a:gsLst>
+            <a:gs pos="0">
+              <a:schemeClr val="phClr">
+                <a:tint val="80000"/>
+                <a:satMod val="300000"/>
+              </a:schemeClr>
+            </a:gs>
+            <a:gs pos="100000">
+              <a:schemeClr val="phClr">
+                <a:shade val="30000"/>
+                <a:satMod val="200000"/>
+              </a:schemeClr>
+            </a:gs>
+          </a:gsLst>
+          <a:path path="circle">
+            <a:fillToRect l="50000" t="50000" r="50000" b="50000"/>
+          </a:path>
+        </a:gradFill>
+      </a:bgFillStyleLst>
+    </a:fmtScheme>
+  </a:themeElements>
+</a:theme>
+</file>
+
+<file path=ppt/theme/theme2.xml><?xml version="1.0" encoding="utf-8"?>
 <a:theme xmlns:a="http://schemas.openxmlformats.org/drawingml/2006/main" xmlns:r="http://schemas.openxmlformats.org/officeDocument/2006/relationships">
   <a:themeElements>
     <a:clrScheme name="Default">
@@ -12297,283 +12511,4 @@
     </a:fmtScheme>
   </a:themeElements>
 </a:theme>
-</file>
-
-<file path=ppt/theme/theme2.xml><?xml version="1.0" encoding="utf-8"?>
-<a:theme xmlns:a="http://schemas.openxmlformats.org/drawingml/2006/main" xmlns:r="http://schemas.openxmlformats.org/officeDocument/2006/relationships" name="Simple Dark">
-  <a:themeElements>
-    <a:clrScheme name="Simple Dark">
-      <a:dk1>
-        <a:srgbClr val="FFFFFF"/>
-      </a:dk1>
-      <a:lt1>
-        <a:srgbClr val="212121"/>
-      </a:lt1>
-      <a:dk2>
-        <a:srgbClr val="303030"/>
-      </a:dk2>
-      <a:lt2>
-        <a:srgbClr val="ADADAD"/>
-      </a:lt2>
-      <a:accent1>
-        <a:srgbClr val="009688"/>
-      </a:accent1>
-      <a:accent2>
-        <a:srgbClr val="EEEEEE"/>
-      </a:accent2>
-      <a:accent3>
-        <a:srgbClr val="78909C"/>
-      </a:accent3>
-      <a:accent4>
-        <a:srgbClr val="FFAB40"/>
-      </a:accent4>
-      <a:accent5>
-        <a:srgbClr val="4DD0E1"/>
-      </a:accent5>
-      <a:accent6>
-        <a:srgbClr val="EEFF41"/>
-      </a:accent6>
-      <a:hlink>
-        <a:srgbClr val="4DD0E1"/>
-      </a:hlink>
-      <a:folHlink>
-        <a:srgbClr val="4DD0E1"/>
-      </a:folHlink>
-    </a:clrScheme>
-    <a:fontScheme name="Office">
-      <a:majorFont>
-        <a:latin typeface="Arial"/>
-        <a:ea typeface=""/>
-        <a:cs typeface=""/>
-        <a:font script="Jpan" typeface="ＭＳ Ｐゴシック"/>
-        <a:font script="Hang" typeface="맑은 고딕"/>
-        <a:font script="Hans" typeface="宋体"/>
-        <a:font script="Hant" typeface="新細明體"/>
-        <a:font script="Arab" typeface="Times New Roman"/>
-        <a:font script="Hebr" typeface="Times New Roman"/>
-        <a:font script="Thai" typeface="Angsana New"/>
-        <a:font script="Ethi" typeface="Nyala"/>
-        <a:font script="Beng" typeface="Vrinda"/>
-        <a:font script="Gujr" typeface="Shruti"/>
-        <a:font script="Khmr" typeface="MoolBoran"/>
-        <a:font script="Knda" typeface="Tunga"/>
-        <a:font script="Guru" typeface="Raavi"/>
-        <a:font script="Cans" typeface="Euphemia"/>
-        <a:font script="Cher" typeface="Plantagenet Cherokee"/>
-        <a:font script="Yiii" typeface="Microsoft Yi Baiti"/>
-        <a:font script="Tibt" typeface="Microsoft Himalaya"/>
-        <a:font script="Thaa" typeface="MV Boli"/>
-        <a:font script="Deva" typeface="Mangal"/>
-        <a:font script="Telu" typeface="Gautami"/>
-        <a:font script="Taml" typeface="Latha"/>
-        <a:font script="Syrc" typeface="Estrangelo Edessa"/>
-        <a:font script="Orya" typeface="Kalinga"/>
-        <a:font script="Mlym" typeface="Kartika"/>
-        <a:font script="Laoo" typeface="DokChampa"/>
-        <a:font script="Sinh" typeface="Iskoola Pota"/>
-        <a:font script="Mong" typeface="Mongolian Baiti"/>
-        <a:font script="Viet" typeface="Times New Roman"/>
-        <a:font script="Uigh" typeface="Microsoft Uighur"/>
-        <a:font script="Geor" typeface="Sylfaen"/>
-      </a:majorFont>
-      <a:minorFont>
-        <a:latin typeface="Arial"/>
-        <a:ea typeface=""/>
-        <a:cs typeface=""/>
-        <a:font script="Jpan" typeface="ＭＳ Ｐゴシック"/>
-        <a:font script="Hang" typeface="맑은 고딕"/>
-        <a:font script="Hans" typeface="宋体"/>
-        <a:font script="Hant" typeface="新細明體"/>
-        <a:font script="Arab" typeface="Arial"/>
-        <a:font script="Hebr" typeface="Arial"/>
-        <a:font script="Thai" typeface="Cordia New"/>
-        <a:font script="Ethi" typeface="Nyala"/>
-        <a:font script="Beng" typeface="Vrinda"/>
-        <a:font script="Gujr" typeface="Shruti"/>
-        <a:font script="Khmr" typeface="DaunPenh"/>
-        <a:font script="Knda" typeface="Tunga"/>
-        <a:font script="Guru" typeface="Raavi"/>
-        <a:font script="Cans" typeface="Euphemia"/>
-        <a:font script="Cher" typeface="Plantagenet Cherokee"/>
-        <a:font script="Yiii" typeface="Microsoft Yi Baiti"/>
-        <a:font script="Tibt" typeface="Microsoft Himalaya"/>
-        <a:font script="Thaa" typeface="MV Boli"/>
-        <a:font script="Deva" typeface="Mangal"/>
-        <a:font script="Telu" typeface="Gautami"/>
-        <a:font script="Taml" typeface="Latha"/>
-        <a:font script="Syrc" typeface="Estrangelo Edessa"/>
-        <a:font script="Orya" typeface="Kalinga"/>
-        <a:font script="Mlym" typeface="Kartika"/>
-        <a:font script="Laoo" typeface="DokChampa"/>
-        <a:font script="Sinh" typeface="Iskoola Pota"/>
-        <a:font script="Mong" typeface="Mongolian Baiti"/>
-        <a:font script="Viet" typeface="Arial"/>
-        <a:font script="Uigh" typeface="Microsoft Uighur"/>
-        <a:font script="Geor" typeface="Sylfaen"/>
-      </a:minorFont>
-    </a:fontScheme>
-    <a:fmtScheme name="Office">
-      <a:fillStyleLst>
-        <a:solidFill>
-          <a:schemeClr val="phClr"/>
-        </a:solidFill>
-        <a:gradFill rotWithShape="1">
-          <a:gsLst>
-            <a:gs pos="0">
-              <a:schemeClr val="phClr">
-                <a:tint val="50000"/>
-                <a:satMod val="300000"/>
-              </a:schemeClr>
-            </a:gs>
-            <a:gs pos="35000">
-              <a:schemeClr val="phClr">
-                <a:tint val="37000"/>
-                <a:satMod val="300000"/>
-              </a:schemeClr>
-            </a:gs>
-            <a:gs pos="100000">
-              <a:schemeClr val="phClr">
-                <a:tint val="15000"/>
-                <a:satMod val="350000"/>
-              </a:schemeClr>
-            </a:gs>
-          </a:gsLst>
-          <a:lin ang="16200000" scaled="1"/>
-        </a:gradFill>
-        <a:gradFill rotWithShape="1">
-          <a:gsLst>
-            <a:gs pos="0">
-              <a:schemeClr val="phClr">
-                <a:tint val="100000"/>
-                <a:shade val="100000"/>
-                <a:satMod val="130000"/>
-              </a:schemeClr>
-            </a:gs>
-            <a:gs pos="100000">
-              <a:schemeClr val="phClr">
-                <a:tint val="50000"/>
-                <a:shade val="100000"/>
-                <a:satMod val="350000"/>
-              </a:schemeClr>
-            </a:gs>
-          </a:gsLst>
-          <a:lin ang="16200000" scaled="0"/>
-        </a:gradFill>
-      </a:fillStyleLst>
-      <a:lnStyleLst>
-        <a:ln w="9525" cap="flat" cmpd="sng" algn="ctr">
-          <a:solidFill>
-            <a:schemeClr val="phClr">
-              <a:shade val="95000"/>
-              <a:satMod val="105000"/>
-            </a:schemeClr>
-          </a:solidFill>
-          <a:prstDash val="solid"/>
-        </a:ln>
-        <a:ln w="25400" cap="flat" cmpd="sng" algn="ctr">
-          <a:solidFill>
-            <a:schemeClr val="phClr"/>
-          </a:solidFill>
-          <a:prstDash val="solid"/>
-        </a:ln>
-        <a:ln w="38100" cap="flat" cmpd="sng" algn="ctr">
-          <a:solidFill>
-            <a:schemeClr val="phClr"/>
-          </a:solidFill>
-          <a:prstDash val="solid"/>
-        </a:ln>
-      </a:lnStyleLst>
-      <a:effectStyleLst>
-        <a:effectStyle>
-          <a:effectLst>
-            <a:outerShdw blurRad="40000" dist="20000" dir="5400000" rotWithShape="0">
-              <a:srgbClr val="000000">
-                <a:alpha val="38000"/>
-              </a:srgbClr>
-            </a:outerShdw>
-          </a:effectLst>
-        </a:effectStyle>
-        <a:effectStyle>
-          <a:effectLst>
-            <a:outerShdw blurRad="40000" dist="23000" dir="5400000" rotWithShape="0">
-              <a:srgbClr val="000000">
-                <a:alpha val="35000"/>
-              </a:srgbClr>
-            </a:outerShdw>
-          </a:effectLst>
-        </a:effectStyle>
-        <a:effectStyle>
-          <a:effectLst>
-            <a:outerShdw blurRad="40000" dist="23000" dir="5400000" rotWithShape="0">
-              <a:srgbClr val="000000">
-                <a:alpha val="35000"/>
-              </a:srgbClr>
-            </a:outerShdw>
-          </a:effectLst>
-          <a:scene3d>
-            <a:camera prst="orthographicFront">
-              <a:rot lat="0" lon="0" rev="0"/>
-            </a:camera>
-            <a:lightRig rig="threePt" dir="t">
-              <a:rot lat="0" lon="0" rev="1200000"/>
-            </a:lightRig>
-          </a:scene3d>
-          <a:sp3d>
-            <a:bevelT w="63500" h="25400"/>
-          </a:sp3d>
-        </a:effectStyle>
-      </a:effectStyleLst>
-      <a:bgFillStyleLst>
-        <a:solidFill>
-          <a:schemeClr val="phClr"/>
-        </a:solidFill>
-        <a:gradFill rotWithShape="1">
-          <a:gsLst>
-            <a:gs pos="0">
-              <a:schemeClr val="phClr">
-                <a:tint val="40000"/>
-                <a:satMod val="350000"/>
-              </a:schemeClr>
-            </a:gs>
-            <a:gs pos="40000">
-              <a:schemeClr val="phClr">
-                <a:tint val="45000"/>
-                <a:shade val="99000"/>
-                <a:satMod val="350000"/>
-              </a:schemeClr>
-            </a:gs>
-            <a:gs pos="100000">
-              <a:schemeClr val="phClr">
-                <a:shade val="20000"/>
-                <a:satMod val="255000"/>
-              </a:schemeClr>
-            </a:gs>
-          </a:gsLst>
-          <a:path path="circle">
-            <a:fillToRect l="50000" t="-80000" r="50000" b="180000"/>
-          </a:path>
-        </a:gradFill>
-        <a:gradFill rotWithShape="1">
-          <a:gsLst>
-            <a:gs pos="0">
-              <a:schemeClr val="phClr">
-                <a:tint val="80000"/>
-                <a:satMod val="300000"/>
-              </a:schemeClr>
-            </a:gs>
-            <a:gs pos="100000">
-              <a:schemeClr val="phClr">
-                <a:shade val="30000"/>
-                <a:satMod val="200000"/>
-              </a:schemeClr>
-            </a:gs>
-          </a:gsLst>
-          <a:path path="circle">
-            <a:fillToRect l="50000" t="50000" r="50000" b="50000"/>
-          </a:path>
-        </a:gradFill>
-      </a:bgFillStyleLst>
-    </a:fmtScheme>
-  </a:themeElements>
-</a:theme>
 </file>
</xml_diff>